<commit_message>
add security chapter 2
</commit_message>
<xml_diff>
--- a/src/assets/1091/ProjectManagement/CH00/00-intro.pptx
+++ b/src/assets/1091/ProjectManagement/CH00/00-intro.pptx
@@ -9744,7 +9744,7 @@
         <p:spPr/>
         <p:txBody>
           <a:bodyPr>
-            <a:normAutofit fontScale="92500" lnSpcReduction="20000"/>
+            <a:normAutofit fontScale="92500" lnSpcReduction="10000"/>
           </a:bodyPr>
           <a:lstStyle/>
           <a:p>
@@ -9816,6 +9816,13 @@
           <a:p>
             <a:pPr lvl="1"/>
             <a:r>
+              <a:rPr lang="en-US" altLang="zh-TW" dirty="0"/>
+              <a:t>A guide to the Project Management Body of Knowledge (PMBOK guide), 6th Ed, ISBN 9781628251845</a:t>
+            </a:r>
+          </a:p>
+          <a:p>
+            <a:pPr lvl="1"/>
+            <a:r>
               <a:rPr lang="zh-TW" altLang="en-US" dirty="0"/>
               <a:t>敏捷專案管理基礎知識與應用實務</a:t>
             </a:r>
@@ -9871,7 +9878,7 @@
             <a:pPr lvl="1"/>
             <a:r>
               <a:rPr lang="zh-TW" altLang="en-US" dirty="0"/>
-              <a:t>期中考（</a:t>
+              <a:t>期中考</a:t>
             </a:r>
             <a:r>
               <a:rPr lang="en-US" altLang="zh-TW" dirty="0"/>
@@ -9879,7 +9886,7 @@
             </a:r>
             <a:r>
               <a:rPr lang="zh-TW" altLang="en-US" dirty="0"/>
-              <a:t>）、期末考（</a:t>
+              <a:t>、期末考</a:t>
             </a:r>
             <a:r>
               <a:rPr lang="en-US" altLang="zh-TW" dirty="0"/>
@@ -9887,14 +9894,7 @@
             </a:r>
             <a:r>
               <a:rPr lang="zh-TW" altLang="en-US" dirty="0"/>
-              <a:t>）</a:t>
-            </a:r>
-          </a:p>
-          <a:p>
-            <a:pPr lvl="1"/>
-            <a:r>
-              <a:rPr lang="zh-TW" altLang="en-US" dirty="0"/>
-              <a:t>平時成績（</a:t>
+              <a:t>、平時</a:t>
             </a:r>
             <a:r>
               <a:rPr lang="en-US" altLang="zh-TW" dirty="0"/>
@@ -9902,23 +9902,7 @@
             </a:r>
             <a:r>
               <a:rPr lang="zh-TW" altLang="en-US" dirty="0"/>
-              <a:t>）</a:t>
-            </a:r>
-            <a:endParaRPr lang="en-US" altLang="zh-TW" dirty="0"/>
-          </a:p>
-          <a:p>
-            <a:pPr lvl="2"/>
-            <a:r>
-              <a:rPr lang="zh-TW" altLang="en-US" dirty="0"/>
-              <a:t>隨堂考試、作業</a:t>
-            </a:r>
-            <a:endParaRPr lang="en-US" altLang="zh-TW" dirty="0"/>
-          </a:p>
-          <a:p>
-            <a:pPr lvl="2"/>
-            <a:r>
-              <a:rPr lang="zh-TW" altLang="en-US" dirty="0"/>
-              <a:t>課程參與</a:t>
+              <a:t>（隨堂考試、作業、課程參與）</a:t>
             </a:r>
           </a:p>
         </p:txBody>

</xml_diff>